<commit_message>
Add light versions for day 1
</commit_message>
<xml_diff>
--- a/slides/Tag-1_4-Git-Remote.pptx
+++ b/slides/Tag-1_4-Git-Remote.pptx
@@ -1688,7 +1688,7 @@
               <a:pPr algn="ctr">
                 <a:defRPr/>
               </a:pPr>
-              <a:t>06.06.2024</a:t>
+              <a:t>10.06.2024</a:t>
             </a:fld>
             <a:endParaRPr lang="de-DE" sz="1000" dirty="0">
               <a:solidFill>
@@ -3795,7 +3795,7 @@
               <a:pPr algn="ctr">
                 <a:defRPr/>
               </a:pPr>
-              <a:t>06.06.2024</a:t>
+              <a:t>10.06.2024</a:t>
             </a:fld>
             <a:endParaRPr lang="de-DE" sz="1000">
               <a:solidFill>
@@ -6178,15 +6178,39 @@
             </a:pPr>
             <a:r>
               <a:rPr lang="de-DE" altLang="de-DE" dirty="0"/>
-              <a:t>Ohne explizite Angabe von &lt;remote&gt; und &lt;remote-</a:t>
-            </a:r>
-            <a:r>
-              <a:rPr lang="de-DE" altLang="de-DE" dirty="0" err="1"/>
+              <a:t>Ohne explizite Angabe von </a:t>
+            </a:r>
+            <a:r>
+              <a:rPr lang="de-DE" altLang="de-DE" dirty="0">
+                <a:latin typeface="Consolas" panose="020B0609020204030204" pitchFamily="49" charset="0"/>
+              </a:rPr>
+              <a:t>&lt;remote&gt;</a:t>
+            </a:r>
+            <a:r>
+              <a:rPr lang="de-DE" altLang="de-DE" dirty="0"/>
+              <a:t> und </a:t>
+            </a:r>
+            <a:r>
+              <a:rPr lang="de-DE" altLang="de-DE" dirty="0">
+                <a:latin typeface="Consolas" panose="020B0609020204030204" pitchFamily="49" charset="0"/>
+              </a:rPr>
+              <a:t>&lt;remote-</a:t>
+            </a:r>
+            <a:r>
+              <a:rPr lang="de-DE" altLang="de-DE" dirty="0" err="1">
+                <a:latin typeface="Consolas" panose="020B0609020204030204" pitchFamily="49" charset="0"/>
+              </a:rPr>
               <a:t>branch</a:t>
             </a:r>
             <a:r>
+              <a:rPr lang="de-DE" altLang="de-DE" dirty="0">
+                <a:latin typeface="Consolas" panose="020B0609020204030204" pitchFamily="49" charset="0"/>
+              </a:rPr>
+              <a:t>&gt;</a:t>
+            </a:r>
+            <a:r>
               <a:rPr lang="de-DE" altLang="de-DE" dirty="0"/>
-              <a:t>&gt; wird der konfigurierte Upstream genutzt</a:t>
+              <a:t> wird der konfigurierte Upstream genutzt</a:t>
             </a:r>
           </a:p>
           <a:p>
@@ -6197,7 +6221,17 @@
             </a:pPr>
             <a:r>
               <a:rPr lang="de-DE" altLang="de-DE" dirty="0"/>
-              <a:t>Mittels -u kann auch beim push ein Upstream eingerichtet werden</a:t>
+              <a:t>Mittels </a:t>
+            </a:r>
+            <a:r>
+              <a:rPr lang="de-DE" altLang="de-DE" dirty="0">
+                <a:latin typeface="Consolas" panose="020B0609020204030204" pitchFamily="49" charset="0"/>
+              </a:rPr>
+              <a:t>-u</a:t>
+            </a:r>
+            <a:r>
+              <a:rPr lang="de-DE" altLang="de-DE" dirty="0"/>
+              <a:t> kann auch beim push ein Upstream eingerichtet werden</a:t>
             </a:r>
           </a:p>
           <a:p>
@@ -8450,15 +8484,21 @@
               <a:t>Kann sowohl genutzt werden, um nach </a:t>
             </a:r>
             <a:r>
-              <a:rPr lang="de-DE" altLang="de-DE" dirty="0" err="1"/>
+              <a:rPr lang="de-DE" altLang="de-DE" dirty="0" err="1">
+                <a:latin typeface="Consolas" panose="020B0609020204030204" pitchFamily="49" charset="0"/>
+              </a:rPr>
               <a:t>git</a:t>
             </a:r>
             <a:r>
-              <a:rPr lang="de-DE" altLang="de-DE" dirty="0"/>
+              <a:rPr lang="de-DE" altLang="de-DE" dirty="0">
+                <a:latin typeface="Consolas" panose="020B0609020204030204" pitchFamily="49" charset="0"/>
+              </a:rPr>
               <a:t> </a:t>
             </a:r>
             <a:r>
-              <a:rPr lang="de-DE" altLang="de-DE" dirty="0" err="1"/>
+              <a:rPr lang="de-DE" altLang="de-DE" dirty="0" err="1">
+                <a:latin typeface="Consolas" panose="020B0609020204030204" pitchFamily="49" charset="0"/>
+              </a:rPr>
               <a:t>clone</a:t>
             </a:r>
             <a:r>

</xml_diff>

<commit_message>
Add sample solutions to exercises
</commit_message>
<xml_diff>
--- a/slides/Tag-1_4-Git-Remote.pptx
+++ b/slides/Tag-1_4-Git-Remote.pptx
@@ -1690,7 +1690,7 @@
               <a:pPr algn="ctr">
                 <a:defRPr/>
               </a:pPr>
-              <a:t>11.06.2024</a:t>
+              <a:t>12.06.2024</a:t>
             </a:fld>
             <a:endParaRPr lang="de-DE" sz="1000" dirty="0">
               <a:solidFill>
@@ -2074,8 +2074,8 @@
         </p:nvSpPr>
         <p:spPr bwMode="auto">
           <a:xfrm>
-            <a:off x="4252913" y="6424613"/>
-            <a:ext cx="1978427" cy="246221"/>
+            <a:off x="4046424" y="6451600"/>
+            <a:ext cx="1632178" cy="246221"/>
           </a:xfrm>
           <a:prstGeom prst="rect">
             <a:avLst/>
@@ -2105,7 +2105,7 @@
                 </a:solidFill>
                 <a:latin typeface="Arial" charset="0"/>
               </a:rPr>
-              <a:t>Tag-1_4-Git-Remote_Light.pptx</a:t>
+              <a:t>Tag-1_4-Git-Remote.pptx</a:t>
             </a:r>
             <a:endParaRPr lang="de-DE" dirty="0">
               <a:solidFill>
@@ -3824,7 +3824,7 @@
               <a:pPr algn="ctr">
                 <a:defRPr/>
               </a:pPr>
-              <a:t>11.06.2024</a:t>
+              <a:t>12.06.2024</a:t>
             </a:fld>
             <a:endParaRPr lang="de-DE" sz="1000">
               <a:solidFill>
@@ -4189,64 +4189,6 @@
               </a:rPr>
               <a:t>Daniel Krämer &amp; Malte Fischer</a:t>
             </a:r>
-          </a:p>
-        </p:txBody>
-      </p:sp>
-      <p:sp>
-        <p:nvSpPr>
-          <p:cNvPr id="1054" name="Text Box 30">
-            <a:extLst>
-              <a:ext uri="{FF2B5EF4-FFF2-40B4-BE49-F238E27FC236}">
-                <a16:creationId xmlns:a16="http://schemas.microsoft.com/office/drawing/2014/main" id="{9346920B-D70B-3A57-06DF-529E537954C8}"/>
-              </a:ext>
-            </a:extLst>
-          </p:cNvPr>
-          <p:cNvSpPr txBox="1">
-            <a:spLocks noChangeArrowheads="1"/>
-          </p:cNvSpPr>
-          <p:nvPr/>
-        </p:nvSpPr>
-        <p:spPr bwMode="auto">
-          <a:xfrm>
-            <a:off x="4252913" y="6424613"/>
-            <a:ext cx="1978427" cy="246221"/>
-          </a:xfrm>
-          <a:prstGeom prst="rect">
-            <a:avLst/>
-          </a:prstGeom>
-          <a:noFill/>
-          <a:ln w="12700">
-            <a:noFill/>
-            <a:miter lim="800000"/>
-            <a:headEnd type="none" w="sm" len="sm"/>
-            <a:tailEnd type="none" w="sm" len="sm"/>
-          </a:ln>
-          <a:effectLst/>
-        </p:spPr>
-        <p:txBody>
-          <a:bodyPr wrap="none">
-            <a:spAutoFit/>
-          </a:bodyPr>
-          <a:lstStyle/>
-          <a:p>
-            <a:pPr defTabSz="762000">
-              <a:defRPr/>
-            </a:pPr>
-            <a:r>
-              <a:rPr lang="de-DE" sz="1000" dirty="0">
-                <a:solidFill>
-                  <a:schemeClr val="bg1"/>
-                </a:solidFill>
-                <a:latin typeface="Arial" charset="0"/>
-              </a:rPr>
-              <a:t>Tag-1_4-Git-Remote_Light.pptx</a:t>
-            </a:r>
-            <a:endParaRPr lang="de-DE" dirty="0">
-              <a:solidFill>
-                <a:schemeClr val="bg1"/>
-              </a:solidFill>
-              <a:latin typeface="Arial" pitchFamily="34" charset="0"/>
-            </a:endParaRPr>
           </a:p>
         </p:txBody>
       </p:sp>
@@ -4709,6 +4651,64 @@
           </a:prstGeom>
         </p:spPr>
       </p:pic>
+      <p:sp>
+        <p:nvSpPr>
+          <p:cNvPr id="4" name="Text Box 30">
+            <a:extLst>
+              <a:ext uri="{FF2B5EF4-FFF2-40B4-BE49-F238E27FC236}">
+                <a16:creationId xmlns:a16="http://schemas.microsoft.com/office/drawing/2014/main" id="{840B1428-EDD6-8BC4-829B-5CA69EFA437C}"/>
+              </a:ext>
+            </a:extLst>
+          </p:cNvPr>
+          <p:cNvSpPr txBox="1">
+            <a:spLocks noChangeArrowheads="1"/>
+          </p:cNvSpPr>
+          <p:nvPr userDrawn="1"/>
+        </p:nvSpPr>
+        <p:spPr bwMode="auto">
+          <a:xfrm>
+            <a:off x="4046424" y="6451600"/>
+            <a:ext cx="1632178" cy="246221"/>
+          </a:xfrm>
+          <a:prstGeom prst="rect">
+            <a:avLst/>
+          </a:prstGeom>
+          <a:noFill/>
+          <a:ln w="12700">
+            <a:noFill/>
+            <a:miter lim="800000"/>
+            <a:headEnd type="none" w="sm" len="sm"/>
+            <a:tailEnd type="none" w="sm" len="sm"/>
+          </a:ln>
+          <a:effectLst/>
+        </p:spPr>
+        <p:txBody>
+          <a:bodyPr wrap="none">
+            <a:spAutoFit/>
+          </a:bodyPr>
+          <a:lstStyle/>
+          <a:p>
+            <a:pPr defTabSz="762000">
+              <a:defRPr/>
+            </a:pPr>
+            <a:r>
+              <a:rPr lang="de-DE" sz="1000" dirty="0">
+                <a:solidFill>
+                  <a:schemeClr val="bg1"/>
+                </a:solidFill>
+                <a:latin typeface="Arial" charset="0"/>
+              </a:rPr>
+              <a:t>Tag-1_4-Git-Remote.pptx</a:t>
+            </a:r>
+            <a:endParaRPr lang="de-DE" dirty="0">
+              <a:solidFill>
+                <a:schemeClr val="bg1"/>
+              </a:solidFill>
+              <a:latin typeface="Arial" pitchFamily="34" charset="0"/>
+            </a:endParaRPr>
+          </a:p>
+        </p:txBody>
+      </p:sp>
     </p:spTree>
     <p:extLst>
       <p:ext uri="{BB962C8B-B14F-4D97-AF65-F5344CB8AC3E}">

</xml_diff>

<commit_message>
1-4 Hecker Consulting Logo auf Titelfolie
</commit_message>
<xml_diff>
--- a/slides/Tag-1_4-Git-Remote.pptx
+++ b/slides/Tag-1_4-Git-Remote.pptx
@@ -1690,7 +1690,7 @@
               <a:pPr algn="ctr">
                 <a:defRPr/>
               </a:pPr>
-              <a:t>12.06.2024</a:t>
+              <a:t>14.06.2024</a:t>
             </a:fld>
             <a:endParaRPr lang="de-DE" sz="1000" dirty="0">
               <a:solidFill>
@@ -3284,6 +3284,42 @@
           </a:p>
         </p:txBody>
       </p:sp>
+      <p:pic>
+        <p:nvPicPr>
+          <p:cNvPr id="2" name="Grafik 1">
+            <a:extLst>
+              <a:ext uri="{FF2B5EF4-FFF2-40B4-BE49-F238E27FC236}">
+                <a16:creationId xmlns:a16="http://schemas.microsoft.com/office/drawing/2014/main" id="{04147974-87B9-1D09-EFB8-4534363C5FE6}"/>
+              </a:ext>
+            </a:extLst>
+          </p:cNvPr>
+          <p:cNvPicPr>
+            <a:picLocks noChangeAspect="1"/>
+          </p:cNvPicPr>
+          <p:nvPr userDrawn="1"/>
+        </p:nvPicPr>
+        <p:blipFill>
+          <a:blip r:embed="rId5">
+            <a:extLst>
+              <a:ext uri="{28A0092B-C50C-407E-A947-70E740481C1C}">
+                <a14:useLocalDpi xmlns:a14="http://schemas.microsoft.com/office/drawing/2010/main" val="0"/>
+              </a:ext>
+            </a:extLst>
+          </a:blip>
+          <a:stretch>
+            <a:fillRect/>
+          </a:stretch>
+        </p:blipFill>
+        <p:spPr>
+          <a:xfrm>
+            <a:off x="3383868" y="4481736"/>
+            <a:ext cx="2376264" cy="2376264"/>
+          </a:xfrm>
+          <a:prstGeom prst="rect">
+            <a:avLst/>
+          </a:prstGeom>
+        </p:spPr>
+      </p:pic>
     </p:spTree>
   </p:cSld>
   <p:clrMap bg1="lt1" tx1="dk1" bg2="lt2" tx2="dk2" accent1="accent1" accent2="accent2" accent3="accent3" accent4="accent4" accent5="accent5" accent6="accent6" hlink="hlink" folHlink="folHlink"/>
@@ -3824,7 +3860,7 @@
               <a:pPr algn="ctr">
                 <a:defRPr/>
               </a:pPr>
-              <a:t>12.06.2024</a:t>
+              <a:t>14.06.2024</a:t>
             </a:fld>
             <a:endParaRPr lang="de-DE" sz="1000">
               <a:solidFill>

</xml_diff>